<commit_message>
pp lectura y escritura, merge errors labview
</commit_message>
<xml_diff>
--- a/GEA3 Python.pptx
+++ b/GEA3 Python.pptx
@@ -5,7 +5,7 @@
     <p:sldMasterId id="2147483672" r:id="rId4"/>
   </p:sldMasterIdLst>
   <p:notesMasterIdLst>
-    <p:notesMasterId r:id="rId18"/>
+    <p:notesMasterId r:id="rId19"/>
   </p:notesMasterIdLst>
   <p:sldIdLst>
     <p:sldId id="256" r:id="rId5"/>
@@ -21,6 +21,7 @@
     <p:sldId id="260" r:id="rId15"/>
     <p:sldId id="265" r:id="rId16"/>
     <p:sldId id="267" r:id="rId17"/>
+    <p:sldId id="269" r:id="rId18"/>
   </p:sldIdLst>
   <p:sldSz cx="12192000" cy="6858000"/>
   <p:notesSz cx="6858000" cy="9144000"/>
@@ -221,7 +222,7 @@
           <a:p>
             <a:fld id="{71104704-7787-4C35-BD96-1DBCE682FE16}" type="datetimeFigureOut">
               <a:rPr lang="es-MX" smtClean="0"/>
-              <a:t>08/03/2023</a:t>
+              <a:t>09/03/2023</a:t>
             </a:fld>
             <a:endParaRPr lang="es-MX"/>
           </a:p>
@@ -7581,6 +7582,86 @@
           </a:prstGeom>
         </p:spPr>
       </p:pic>
+      <p:sp>
+        <p:nvSpPr>
+          <p:cNvPr id="3" name="TextBox 2">
+            <a:extLst>
+              <a:ext uri="{FF2B5EF4-FFF2-40B4-BE49-F238E27FC236}">
+                <a16:creationId xmlns:a16="http://schemas.microsoft.com/office/drawing/2014/main" id="{CF6349AA-7092-4EA4-9FF5-11A4AAF858E1}"/>
+              </a:ext>
+            </a:extLst>
+          </p:cNvPr>
+          <p:cNvSpPr txBox="1"/>
+          <p:nvPr/>
+        </p:nvSpPr>
+        <p:spPr>
+          <a:xfrm>
+            <a:off x="502023" y="1103120"/>
+            <a:ext cx="11187953" cy="1429622"/>
+          </a:xfrm>
+          <a:prstGeom prst="rect">
+            <a:avLst/>
+          </a:prstGeom>
+          <a:noFill/>
+        </p:spPr>
+        <p:txBody>
+          <a:bodyPr wrap="square" rtlCol="0">
+            <a:spAutoFit/>
+          </a:bodyPr>
+          <a:lstStyle/>
+          <a:p>
+            <a:pPr algn="just">
+              <a:lnSpc>
+                <a:spcPct val="150000"/>
+              </a:lnSpc>
+            </a:pPr>
+            <a:r>
+              <a:rPr lang="es-MX" sz="2000" dirty="0"/>
+              <a:t>En el siguiente código se observa la construcción de la trama de datos para el </a:t>
+            </a:r>
+            <a:r>
+              <a:rPr lang="es-MX" sz="2000" dirty="0" err="1"/>
+              <a:t>resquest</a:t>
+            </a:r>
+            <a:r>
+              <a:rPr lang="es-MX" sz="2000" dirty="0"/>
+              <a:t> de la escritura, en el cual ya se tiene definido el bit de inicio, </a:t>
+            </a:r>
+            <a:r>
+              <a:rPr lang="es-MX" sz="2000" dirty="0" err="1"/>
+              <a:t>src</a:t>
+            </a:r>
+            <a:r>
+              <a:rPr lang="es-MX" sz="2000" dirty="0"/>
+              <a:t>, </a:t>
+            </a:r>
+            <a:r>
+              <a:rPr lang="es-MX" sz="2000" dirty="0" err="1"/>
+              <a:t>cmd</a:t>
+            </a:r>
+            <a:r>
+              <a:rPr lang="es-MX" sz="2000" dirty="0"/>
+              <a:t> y el bit de Stop, ya solo se hace el cálculo de </a:t>
+            </a:r>
+            <a:r>
+              <a:rPr lang="es-MX" sz="2000" dirty="0" err="1"/>
+              <a:t>crc</a:t>
+            </a:r>
+            <a:r>
+              <a:rPr lang="es-MX" sz="2000" dirty="0"/>
+              <a:t> y la longitud de la trama, además de concatenar el ERD y </a:t>
+            </a:r>
+            <a:r>
+              <a:rPr lang="es-MX" sz="2000" dirty="0" err="1"/>
+              <a:t>Dst</a:t>
+            </a:r>
+            <a:r>
+              <a:rPr lang="es-MX" sz="2000" dirty="0"/>
+              <a:t> y Dato definida por el usuario.</a:t>
+            </a:r>
+          </a:p>
+        </p:txBody>
+      </p:sp>
     </p:spTree>
     <p:extLst>
       <p:ext uri="{BB962C8B-B14F-4D97-AF65-F5344CB8AC3E}">
@@ -7632,8 +7713,148 @@
         </p:blipFill>
         <p:spPr>
           <a:xfrm>
-            <a:off x="3707016" y="2292992"/>
-            <a:ext cx="4777967" cy="4172532"/>
+            <a:off x="3949382" y="2768122"/>
+            <a:ext cx="4293231" cy="3749219"/>
+          </a:xfrm>
+          <a:prstGeom prst="rect">
+            <a:avLst/>
+          </a:prstGeom>
+        </p:spPr>
+      </p:pic>
+      <p:sp>
+        <p:nvSpPr>
+          <p:cNvPr id="3" name="TextBox 2">
+            <a:extLst>
+              <a:ext uri="{FF2B5EF4-FFF2-40B4-BE49-F238E27FC236}">
+                <a16:creationId xmlns:a16="http://schemas.microsoft.com/office/drawing/2014/main" id="{B3CF6321-1AE6-49F2-8845-0497313F7684}"/>
+              </a:ext>
+            </a:extLst>
+          </p:cNvPr>
+          <p:cNvSpPr txBox="1"/>
+          <p:nvPr/>
+        </p:nvSpPr>
+        <p:spPr>
+          <a:xfrm>
+            <a:off x="502022" y="1186100"/>
+            <a:ext cx="11187953" cy="1429622"/>
+          </a:xfrm>
+          <a:prstGeom prst="rect">
+            <a:avLst/>
+          </a:prstGeom>
+          <a:noFill/>
+        </p:spPr>
+        <p:txBody>
+          <a:bodyPr wrap="square" rtlCol="0">
+            <a:spAutoFit/>
+          </a:bodyPr>
+          <a:lstStyle/>
+          <a:p>
+            <a:pPr algn="just">
+              <a:lnSpc>
+                <a:spcPct val="150000"/>
+              </a:lnSpc>
+            </a:pPr>
+            <a:r>
+              <a:rPr lang="es-MX" sz="2000" dirty="0"/>
+              <a:t>En este caso para la escritura de la trama y lectura del response, la función es muy similar que el de la lectura, el único cambio que se tiene es eliminar espacios en dato, además que se usa la estructura para la escritura.</a:t>
+            </a:r>
+          </a:p>
+        </p:txBody>
+      </p:sp>
+    </p:spTree>
+    <p:extLst>
+      <p:ext uri="{BB962C8B-B14F-4D97-AF65-F5344CB8AC3E}">
+        <p14:creationId xmlns:p14="http://schemas.microsoft.com/office/powerpoint/2010/main" val="3327956550"/>
+      </p:ext>
+    </p:extLst>
+  </p:cSld>
+  <p:clrMapOvr>
+    <a:masterClrMapping/>
+  </p:clrMapOvr>
+</p:sld>
+</file>
+
+<file path=ppt/slides/slide14.xml><?xml version="1.0" encoding="utf-8"?>
+<p:sld xmlns:a="http://schemas.openxmlformats.org/drawingml/2006/main" xmlns:r="http://schemas.openxmlformats.org/officeDocument/2006/relationships" xmlns:p="http://schemas.openxmlformats.org/presentationml/2006/main">
+  <p:cSld>
+    <p:spTree>
+      <p:nvGrpSpPr>
+        <p:cNvPr id="1" name=""/>
+        <p:cNvGrpSpPr/>
+        <p:nvPr/>
+      </p:nvGrpSpPr>
+      <p:grpSpPr>
+        <a:xfrm>
+          <a:off x="0" y="0"/>
+          <a:ext cx="0" cy="0"/>
+          <a:chOff x="0" y="0"/>
+          <a:chExt cx="0" cy="0"/>
+        </a:xfrm>
+      </p:grpSpPr>
+      <p:sp>
+        <p:nvSpPr>
+          <p:cNvPr id="2" name="TextBox 1">
+            <a:extLst>
+              <a:ext uri="{FF2B5EF4-FFF2-40B4-BE49-F238E27FC236}">
+                <a16:creationId xmlns:a16="http://schemas.microsoft.com/office/drawing/2014/main" id="{881A730F-C681-479A-8B89-20ED1AF42E17}"/>
+              </a:ext>
+            </a:extLst>
+          </p:cNvPr>
+          <p:cNvSpPr txBox="1"/>
+          <p:nvPr/>
+        </p:nvSpPr>
+        <p:spPr>
+          <a:xfrm>
+            <a:off x="502022" y="1186100"/>
+            <a:ext cx="11187953" cy="1429622"/>
+          </a:xfrm>
+          <a:prstGeom prst="rect">
+            <a:avLst/>
+          </a:prstGeom>
+          <a:noFill/>
+        </p:spPr>
+        <p:txBody>
+          <a:bodyPr wrap="square" rtlCol="0">
+            <a:spAutoFit/>
+          </a:bodyPr>
+          <a:lstStyle/>
+          <a:p>
+            <a:pPr algn="just">
+              <a:lnSpc>
+                <a:spcPct val="150000"/>
+              </a:lnSpc>
+            </a:pPr>
+            <a:r>
+              <a:rPr lang="es-MX" sz="2000" dirty="0"/>
+              <a:t>Por último también se tiene la función para validar la longitud del ERD, el cuál tiene la función de completar con ceros a la izquierda si la longitud del ERD es menor que cuatro y también de mandar un fallo si el tamaño del ERD es mayor que cuatro.</a:t>
+            </a:r>
+          </a:p>
+        </p:txBody>
+      </p:sp>
+      <p:pic>
+        <p:nvPicPr>
+          <p:cNvPr id="4" name="Picture 3">
+            <a:extLst>
+              <a:ext uri="{FF2B5EF4-FFF2-40B4-BE49-F238E27FC236}">
+                <a16:creationId xmlns:a16="http://schemas.microsoft.com/office/drawing/2014/main" id="{A9A2287A-7FAC-49C9-83EE-0026FD60AD06}"/>
+              </a:ext>
+            </a:extLst>
+          </p:cNvPr>
+          <p:cNvPicPr>
+            <a:picLocks noChangeAspect="1"/>
+          </p:cNvPicPr>
+          <p:nvPr/>
+        </p:nvPicPr>
+        <p:blipFill>
+          <a:blip r:embed="rId2"/>
+          <a:stretch>
+            <a:fillRect/>
+          </a:stretch>
+        </p:blipFill>
+        <p:spPr>
+          <a:xfrm>
+            <a:off x="3840647" y="3052482"/>
+            <a:ext cx="4510702" cy="2227507"/>
           </a:xfrm>
           <a:prstGeom prst="rect">
             <a:avLst/>
@@ -7643,7 +7864,7 @@
     </p:spTree>
     <p:extLst>
       <p:ext uri="{BB962C8B-B14F-4D97-AF65-F5344CB8AC3E}">
-        <p14:creationId xmlns:p14="http://schemas.microsoft.com/office/powerpoint/2010/main" val="3327956550"/>
+        <p14:creationId xmlns:p14="http://schemas.microsoft.com/office/powerpoint/2010/main" val="1810792743"/>
       </p:ext>
     </p:extLst>
   </p:cSld>
@@ -7838,8 +8059,133 @@
         </p:blipFill>
         <p:spPr bwMode="auto">
           <a:xfrm>
-            <a:off x="4010025" y="2981325"/>
-            <a:ext cx="4171950" cy="1809750"/>
+            <a:off x="4457208" y="2262354"/>
+            <a:ext cx="3277579" cy="1421781"/>
+          </a:xfrm>
+          <a:prstGeom prst="rect">
+            <a:avLst/>
+          </a:prstGeom>
+          <a:noFill/>
+          <a:extLst>
+            <a:ext uri="{909E8E84-426E-40DD-AFC4-6F175D3DCCD1}">
+              <a14:hiddenFill xmlns:a14="http://schemas.microsoft.com/office/drawing/2010/main">
+                <a:solidFill>
+                  <a:srgbClr val="FFFFFF"/>
+                </a:solidFill>
+              </a14:hiddenFill>
+            </a:ext>
+          </a:extLst>
+        </p:spPr>
+      </p:pic>
+      <p:sp>
+        <p:nvSpPr>
+          <p:cNvPr id="3" name="TextBox 2">
+            <a:extLst>
+              <a:ext uri="{FF2B5EF4-FFF2-40B4-BE49-F238E27FC236}">
+                <a16:creationId xmlns:a16="http://schemas.microsoft.com/office/drawing/2014/main" id="{6C0AB3B7-C59F-4D77-B816-1372A326A1D0}"/>
+              </a:ext>
+            </a:extLst>
+          </p:cNvPr>
+          <p:cNvSpPr txBox="1"/>
+          <p:nvPr/>
+        </p:nvSpPr>
+        <p:spPr>
+          <a:xfrm>
+            <a:off x="502023" y="1231555"/>
+            <a:ext cx="11187953" cy="967957"/>
+          </a:xfrm>
+          <a:prstGeom prst="rect">
+            <a:avLst/>
+          </a:prstGeom>
+          <a:noFill/>
+        </p:spPr>
+        <p:txBody>
+          <a:bodyPr wrap="square" rtlCol="0">
+            <a:spAutoFit/>
+          </a:bodyPr>
+          <a:lstStyle/>
+          <a:p>
+            <a:pPr algn="just">
+              <a:lnSpc>
+                <a:spcPct val="150000"/>
+              </a:lnSpc>
+            </a:pPr>
+            <a:r>
+              <a:rPr lang="es-MX" sz="2000" dirty="0"/>
+              <a:t>Para el caso de la conexión física, su conexión es la estándar de la comunicación serial, ya que solo se necesita TX, RX Y GND, la cuál se hace la conexión como se muestra en la siguiente imagen.</a:t>
+            </a:r>
+          </a:p>
+        </p:txBody>
+      </p:sp>
+      <p:sp>
+        <p:nvSpPr>
+          <p:cNvPr id="4" name="TextBox 3">
+            <a:extLst>
+              <a:ext uri="{FF2B5EF4-FFF2-40B4-BE49-F238E27FC236}">
+                <a16:creationId xmlns:a16="http://schemas.microsoft.com/office/drawing/2014/main" id="{3B934E9C-459A-4FD6-8337-D74EA711DA6C}"/>
+              </a:ext>
+            </a:extLst>
+          </p:cNvPr>
+          <p:cNvSpPr txBox="1"/>
+          <p:nvPr/>
+        </p:nvSpPr>
+        <p:spPr>
+          <a:xfrm>
+            <a:off x="502023" y="3746977"/>
+            <a:ext cx="11187953" cy="506292"/>
+          </a:xfrm>
+          <a:prstGeom prst="rect">
+            <a:avLst/>
+          </a:prstGeom>
+          <a:noFill/>
+        </p:spPr>
+        <p:txBody>
+          <a:bodyPr wrap="square" rtlCol="0">
+            <a:spAutoFit/>
+          </a:bodyPr>
+          <a:lstStyle/>
+          <a:p>
+            <a:pPr algn="just">
+              <a:lnSpc>
+                <a:spcPct val="150000"/>
+              </a:lnSpc>
+            </a:pPr>
+            <a:r>
+              <a:rPr lang="es-MX" sz="2000" dirty="0"/>
+              <a:t>Para ello se usó un convertidor UBS a TTL al cable RJ45</a:t>
+            </a:r>
+          </a:p>
+        </p:txBody>
+      </p:sp>
+      <p:pic>
+        <p:nvPicPr>
+          <p:cNvPr id="1028" name="Picture 4" descr="Multimedia">
+            <a:extLst>
+              <a:ext uri="{FF2B5EF4-FFF2-40B4-BE49-F238E27FC236}">
+                <a16:creationId xmlns:a16="http://schemas.microsoft.com/office/drawing/2014/main" id="{9EB67BCB-0FC0-4AA1-B5F5-C06A41F6D5E1}"/>
+              </a:ext>
+            </a:extLst>
+          </p:cNvPr>
+          <p:cNvPicPr>
+            <a:picLocks noChangeAspect="1" noChangeArrowheads="1"/>
+          </p:cNvPicPr>
+          <p:nvPr/>
+        </p:nvPicPr>
+        <p:blipFill rotWithShape="1">
+          <a:blip r:embed="rId3" cstate="print">
+            <a:extLst>
+              <a:ext uri="{28A0092B-C50C-407E-A947-70E740481C1C}">
+                <a14:useLocalDpi xmlns:a14="http://schemas.microsoft.com/office/drawing/2010/main" val="0"/>
+              </a:ext>
+            </a:extLst>
+          </a:blip>
+          <a:srcRect l="32397" t="35033" b="27974"/>
+          <a:stretch/>
+        </p:blipFill>
+        <p:spPr bwMode="auto">
+          <a:xfrm>
+            <a:off x="4686157" y="4490225"/>
+            <a:ext cx="2819679" cy="2057285"/>
           </a:xfrm>
           <a:prstGeom prst="rect">
             <a:avLst/>
@@ -9313,13 +9659,8 @@
             </a:r>
             <a:r>
               <a:rPr lang="es-MX" sz="2000" dirty="0"/>
-              <a:t> se calcula con los siguientes datos de la </a:t>
+              <a:t> se calcula con los siguientes datos de la trama:</a:t>
             </a:r>
-            <a:r>
-              <a:rPr lang="es-MX" sz="2000" dirty="0" err="1"/>
-              <a:t>trama:C</a:t>
-            </a:r>
-            <a:endParaRPr lang="es-MX" sz="2000" dirty="0"/>
           </a:p>
         </p:txBody>
       </p:sp>
@@ -11152,7 +11493,7 @@
         </p:blipFill>
         <p:spPr>
           <a:xfrm>
-            <a:off x="4145407" y="3045574"/>
+            <a:off x="4145405" y="2973857"/>
             <a:ext cx="3901185" cy="3337297"/>
           </a:xfrm>
           <a:prstGeom prst="rect">
@@ -11203,7 +11544,7 @@
             </a:r>
             <a:r>
               <a:rPr lang="es-MX" sz="2000" dirty="0"/>
-              <a:t>, donde se le da de parámetro la trama construida para su cálculo y este retorna el </a:t>
+              <a:t>, donde se le da de parámetro la trama mencionada anteriormente para su cálculo y este retorna el valor del </a:t>
             </a:r>
             <a:r>
               <a:rPr lang="es-MX" sz="2000" dirty="0" err="1"/>
@@ -11219,7 +11560,7 @@
             </a:r>
             <a:r>
               <a:rPr lang="es-MX" sz="2000" dirty="0"/>
-              <a:t>, además de que este valor siempre será de 2 bytes de longitud</a:t>
+              <a:t>, además de que este valor siempre será de 2 bytes de longitud. </a:t>
             </a:r>
           </a:p>
         </p:txBody>
@@ -17492,6 +17833,54 @@
           </a:prstGeom>
         </p:spPr>
       </p:pic>
+      <p:sp>
+        <p:nvSpPr>
+          <p:cNvPr id="3" name="TextBox 2">
+            <a:extLst>
+              <a:ext uri="{FF2B5EF4-FFF2-40B4-BE49-F238E27FC236}">
+                <a16:creationId xmlns:a16="http://schemas.microsoft.com/office/drawing/2014/main" id="{C3E27E45-2A4B-4DB8-92EB-06289B8E1B69}"/>
+              </a:ext>
+            </a:extLst>
+          </p:cNvPr>
+          <p:cNvSpPr txBox="1"/>
+          <p:nvPr/>
+        </p:nvSpPr>
+        <p:spPr>
+          <a:xfrm>
+            <a:off x="502023" y="1246555"/>
+            <a:ext cx="11187953" cy="967957"/>
+          </a:xfrm>
+          <a:prstGeom prst="rect">
+            <a:avLst/>
+          </a:prstGeom>
+          <a:noFill/>
+        </p:spPr>
+        <p:txBody>
+          <a:bodyPr wrap="square" rtlCol="0">
+            <a:spAutoFit/>
+          </a:bodyPr>
+          <a:lstStyle/>
+          <a:p>
+            <a:pPr algn="just">
+              <a:lnSpc>
+                <a:spcPct val="150000"/>
+              </a:lnSpc>
+            </a:pPr>
+            <a:r>
+              <a:rPr lang="es-MX" sz="2000" dirty="0"/>
+              <a:t>La siguiente función, es la que se encarga de escribir la trama y leer la respuesta, para esto entra dentro un ciclo </a:t>
+            </a:r>
+            <a:r>
+              <a:rPr lang="es-MX" sz="2000" dirty="0" err="1"/>
+              <a:t>while</a:t>
+            </a:r>
+            <a:r>
+              <a:rPr lang="es-MX" sz="2000" dirty="0"/>
+              <a:t> para leer de byte en byte y salir en cuanto encuentre el bit de paro o encontrar una byte vacío. </a:t>
+            </a:r>
+          </a:p>
+        </p:txBody>
+      </p:sp>
     </p:spTree>
     <p:extLst>
       <p:ext uri="{BB962C8B-B14F-4D97-AF65-F5344CB8AC3E}">
@@ -18058,6 +18447,15 @@
 </file>
 
 <file path=customXml/item2.xml><?xml version="1.0" encoding="utf-8"?>
+<?mso-contentType ?>
+<FormTemplates xmlns="http://schemas.microsoft.com/sharepoint/v3/contenttype/forms">
+  <Display>DocumentLibraryForm</Display>
+  <Edit>DocumentLibraryForm</Edit>
+  <New>DocumentLibraryForm</New>
+</FormTemplates>
+</file>
+
+<file path=customXml/item3.xml><?xml version="1.0" encoding="utf-8"?>
 <ct:contentTypeSchema xmlns:ct="http://schemas.microsoft.com/office/2006/metadata/contentType" xmlns:ma="http://schemas.microsoft.com/office/2006/metadata/properties/metaAttributes" ct:_="" ma:_="" ma:contentTypeName="Documento" ma:contentTypeID="0x010100980E67F9E161EA4FA57F1D7A7D4BC8AD" ma:contentTypeVersion="2" ma:contentTypeDescription="Crear nuevo documento." ma:contentTypeScope="" ma:versionID="e80381d13a1c7d17d0532dbd7387dd0d">
   <xsd:schema xmlns:xsd="http://www.w3.org/2001/XMLSchema" xmlns:xs="http://www.w3.org/2001/XMLSchema" xmlns:p="http://schemas.microsoft.com/office/2006/metadata/properties" xmlns:ns2="8accf49b-5917-40c4-beb3-28cc890efc32" targetNamespace="http://schemas.microsoft.com/office/2006/metadata/properties" ma:root="true" ma:fieldsID="6084333c95072d4d1435239dd1484cb9" ns2:_="">
     <xsd:import namespace="8accf49b-5917-40c4-beb3-28cc890efc32"/>
@@ -18205,15 +18603,6 @@
 </ct:contentTypeSchema>
 </file>
 
-<file path=customXml/item3.xml><?xml version="1.0" encoding="utf-8"?>
-<?mso-contentType ?>
-<FormTemplates xmlns="http://schemas.microsoft.com/sharepoint/v3/contenttype/forms">
-  <Display>DocumentLibraryForm</Display>
-  <Edit>DocumentLibraryForm</Edit>
-  <New>DocumentLibraryForm</New>
-</FormTemplates>
-</file>
-
 <file path=customXml/itemProps1.xml><?xml version="1.0" encoding="utf-8"?>
 <ds:datastoreItem xmlns:ds="http://schemas.openxmlformats.org/officeDocument/2006/customXml" ds:itemID="{622119FC-E218-46EB-8A0F-D69935C8F995}">
   <ds:schemaRefs>
@@ -18231,6 +18620,14 @@
 </file>
 
 <file path=customXml/itemProps2.xml><?xml version="1.0" encoding="utf-8"?>
+<ds:datastoreItem xmlns:ds="http://schemas.openxmlformats.org/officeDocument/2006/customXml" ds:itemID="{90CC0492-A604-4894-A72D-AC335F342AFD}">
+  <ds:schemaRefs>
+    <ds:schemaRef ds:uri="http://schemas.microsoft.com/sharepoint/v3/contenttype/forms"/>
+  </ds:schemaRefs>
+</ds:datastoreItem>
+</file>
+
+<file path=customXml/itemProps3.xml><?xml version="1.0" encoding="utf-8"?>
 <ds:datastoreItem xmlns:ds="http://schemas.openxmlformats.org/officeDocument/2006/customXml" ds:itemID="{681266F2-718F-4832-9B33-52318494A522}">
   <ds:schemaRefs>
     <ds:schemaRef ds:uri="http://schemas.microsoft.com/office/2006/metadata/contentType"/>
@@ -18246,12 +18643,4 @@
     <ds:schemaRef ds:uri="http://schemas.microsoft.com/internal/obd"/>
   </ds:schemaRefs>
 </ds:datastoreItem>
-</file>
-
-<file path=customXml/itemProps3.xml><?xml version="1.0" encoding="utf-8"?>
-<ds:datastoreItem xmlns:ds="http://schemas.openxmlformats.org/officeDocument/2006/customXml" ds:itemID="{90CC0492-A604-4894-A72D-AC335F342AFD}">
-  <ds:schemaRefs>
-    <ds:schemaRef ds:uri="http://schemas.microsoft.com/sharepoint/v3/contenttype/forms"/>
-  </ds:schemaRefs>
-</ds:datastoreItem>
 </file>
</xml_diff>